<commit_message>
changes made at 5:56pm
</commit_message>
<xml_diff>
--- a/deck.pptx
+++ b/deck.pptx
@@ -21777,9 +21777,12 @@
               <a:buChar char="•"/>
             </a:pPr>
             <a:r>
-              <a:rPr lang="en-US" dirty="0"/>
-              <a:t>Deployed [TO-DO]</a:t>
+              <a:rPr lang="en-US" u="sng" dirty="0">
+                <a:hlinkClick r:id="rId2"/>
+              </a:rPr>
+              <a:t>https://wrkfullerton.github.io/StockStalker/</a:t>
             </a:r>
+            <a:endParaRPr lang="en-US" u="sng" dirty="0"/>
           </a:p>
           <a:p>
             <a:pPr marL="285750" indent="-285750">
@@ -21787,9 +21790,18 @@
               <a:buChar char="•"/>
             </a:pPr>
             <a:r>
-              <a:rPr lang="en-US" dirty="0"/>
-              <a:t>GitHub repo [TO-DO]</a:t>
+              <a:rPr lang="en-US" dirty="0">
+                <a:hlinkClick r:id="rId3"/>
+              </a:rPr>
+              <a:t>https://github.com/wrkfullerton/</a:t>
             </a:r>
+            <a:r>
+              <a:rPr lang="en-US">
+                <a:hlinkClick r:id="rId3"/>
+              </a:rPr>
+              <a:t>StockStalker</a:t>
+            </a:r>
+            <a:endParaRPr lang="en-US" dirty="0"/>
           </a:p>
         </p:txBody>
       </p:sp>

</xml_diff>

<commit_message>
add final changes to deck
</commit_message>
<xml_diff>
--- a/deck.pptx
+++ b/deck.pptx
@@ -13586,8 +13586,8 @@
         </p:nvSpPr>
         <p:spPr>
           <a:xfrm>
-            <a:off x="5256441" y="4293712"/>
-            <a:ext cx="1922321" cy="369332"/>
+            <a:off x="4735676" y="4271758"/>
+            <a:ext cx="3038011" cy="369332"/>
           </a:xfrm>
           <a:prstGeom prst="rect">
             <a:avLst/>
@@ -13611,7 +13611,7 @@
                 <a:ea typeface="Apple Symbols" panose="02000000000000000000" pitchFamily="2" charset="-79"/>
                 <a:cs typeface="Beirut" pitchFamily="2" charset="-78"/>
               </a:rPr>
-              <a:t>Catchy Slogan</a:t>
+              <a:t>Own the (Market) Curve</a:t>
             </a:r>
             <a:endParaRPr lang="en-US" dirty="0"/>
           </a:p>
@@ -14941,6 +14941,211 @@
               </a:rPr>
               <a:t>Elevator Pitch</a:t>
             </a:r>
+          </a:p>
+        </p:txBody>
+      </p:sp>
+      <p:sp>
+        <p:nvSpPr>
+          <p:cNvPr id="3" name="Rectangle 2">
+            <a:extLst>
+              <a:ext uri="{FF2B5EF4-FFF2-40B4-BE49-F238E27FC236}">
+                <a16:creationId xmlns:a16="http://schemas.microsoft.com/office/drawing/2014/main" id="{246738E1-87C6-2546-AE5E-D8918BC33C9B}"/>
+              </a:ext>
+            </a:extLst>
+          </p:cNvPr>
+          <p:cNvSpPr/>
+          <p:nvPr/>
+        </p:nvSpPr>
+        <p:spPr>
+          <a:xfrm>
+            <a:off x="423561" y="2126979"/>
+            <a:ext cx="4734581" cy="2308324"/>
+          </a:xfrm>
+          <a:prstGeom prst="rect">
+            <a:avLst/>
+          </a:prstGeom>
+        </p:spPr>
+        <p:txBody>
+          <a:bodyPr wrap="square">
+            <a:spAutoFit/>
+          </a:bodyPr>
+          <a:lstStyle/>
+          <a:p>
+            <a:r>
+              <a:rPr lang="en-US" dirty="0"/>
+              <a:t>As COVID-19 has put the world of pause, stock-markets and companies have taken a massive hit. And so stock market investors are needing timely information, to protect their investments and assets… </a:t>
+            </a:r>
+          </a:p>
+          <a:p>
+            <a:endParaRPr lang="en-US" dirty="0"/>
+          </a:p>
+          <a:p>
+            <a:r>
+              <a:rPr lang="en-US" dirty="0"/>
+              <a:t>At Stock Stalker we assist users “own the market curve” through our mobile app. </a:t>
+            </a:r>
+          </a:p>
+        </p:txBody>
+      </p:sp>
+      <p:pic>
+        <p:nvPicPr>
+          <p:cNvPr id="6" name="Graphic 5" descr="Bar graph with downward trend">
+            <a:extLst>
+              <a:ext uri="{FF2B5EF4-FFF2-40B4-BE49-F238E27FC236}">
+                <a16:creationId xmlns:a16="http://schemas.microsoft.com/office/drawing/2014/main" id="{5ADBAABE-4B2B-C146-9850-4064230CBE9D}"/>
+              </a:ext>
+            </a:extLst>
+          </p:cNvPr>
+          <p:cNvPicPr>
+            <a:picLocks noChangeAspect="1"/>
+          </p:cNvPicPr>
+          <p:nvPr/>
+        </p:nvPicPr>
+        <p:blipFill>
+          <a:blip r:embed="rId2">
+            <a:extLst>
+              <a:ext uri="{96DAC541-7B7A-43D3-8B79-37D633B846F1}">
+                <asvg:svgBlip xmlns:asvg="http://schemas.microsoft.com/office/drawing/2016/SVG/main" r:embed="rId3"/>
+              </a:ext>
+            </a:extLst>
+          </a:blip>
+          <a:stretch>
+            <a:fillRect/>
+          </a:stretch>
+        </p:blipFill>
+        <p:spPr>
+          <a:xfrm>
+            <a:off x="5927787" y="2048228"/>
+            <a:ext cx="2245743" cy="2245743"/>
+          </a:xfrm>
+          <a:prstGeom prst="rect">
+            <a:avLst/>
+          </a:prstGeom>
+        </p:spPr>
+      </p:pic>
+      <p:cxnSp>
+        <p:nvCxnSpPr>
+          <p:cNvPr id="8" name="Straight Arrow Connector 7">
+            <a:extLst>
+              <a:ext uri="{FF2B5EF4-FFF2-40B4-BE49-F238E27FC236}">
+                <a16:creationId xmlns:a16="http://schemas.microsoft.com/office/drawing/2014/main" id="{A9C08AB4-1D21-4F41-8BF3-72214AD1153A}"/>
+              </a:ext>
+            </a:extLst>
+          </p:cNvPr>
+          <p:cNvCxnSpPr>
+            <a:stCxn id="6" idx="3"/>
+          </p:cNvCxnSpPr>
+          <p:nvPr/>
+        </p:nvCxnSpPr>
+        <p:spPr>
+          <a:xfrm flipV="1">
+            <a:off x="8173530" y="3165231"/>
+            <a:ext cx="769645" cy="5869"/>
+          </a:xfrm>
+          <a:prstGeom prst="straightConnector1">
+            <a:avLst/>
+          </a:prstGeom>
+          <a:ln w="69850">
+            <a:solidFill>
+              <a:schemeClr val="bg1">
+                <a:lumMod val="75000"/>
+              </a:schemeClr>
+            </a:solidFill>
+            <a:tailEnd type="triangle"/>
+          </a:ln>
+        </p:spPr>
+        <p:style>
+          <a:lnRef idx="1">
+            <a:schemeClr val="accent1"/>
+          </a:lnRef>
+          <a:fillRef idx="0">
+            <a:schemeClr val="accent1"/>
+          </a:fillRef>
+          <a:effectRef idx="0">
+            <a:schemeClr val="accent1"/>
+          </a:effectRef>
+          <a:fontRef idx="minor">
+            <a:schemeClr val="tx1"/>
+          </a:fontRef>
+        </p:style>
+      </p:cxnSp>
+      <p:pic>
+        <p:nvPicPr>
+          <p:cNvPr id="11" name="Graphic 10">
+            <a:extLst>
+              <a:ext uri="{FF2B5EF4-FFF2-40B4-BE49-F238E27FC236}">
+                <a16:creationId xmlns:a16="http://schemas.microsoft.com/office/drawing/2014/main" id="{383BA89E-BD90-964F-B33B-08FA8E53431E}"/>
+              </a:ext>
+            </a:extLst>
+          </p:cNvPr>
+          <p:cNvPicPr>
+            <a:picLocks noChangeAspect="1"/>
+          </p:cNvPicPr>
+          <p:nvPr/>
+        </p:nvPicPr>
+        <p:blipFill>
+          <a:blip r:embed="rId4">
+            <a:extLst>
+              <a:ext uri="{96DAC541-7B7A-43D3-8B79-37D633B846F1}">
+                <asvg:svgBlip xmlns:asvg="http://schemas.microsoft.com/office/drawing/2016/SVG/main" r:embed="rId5"/>
+              </a:ext>
+            </a:extLst>
+          </a:blip>
+          <a:srcRect/>
+          <a:stretch/>
+        </p:blipFill>
+        <p:spPr>
+          <a:xfrm>
+            <a:off x="9001205" y="2096036"/>
+            <a:ext cx="2212707" cy="2212707"/>
+          </a:xfrm>
+          <a:prstGeom prst="rect">
+            <a:avLst/>
+          </a:prstGeom>
+        </p:spPr>
+      </p:pic>
+      <p:sp>
+        <p:nvSpPr>
+          <p:cNvPr id="12" name="Rectangle 11">
+            <a:extLst>
+              <a:ext uri="{FF2B5EF4-FFF2-40B4-BE49-F238E27FC236}">
+                <a16:creationId xmlns:a16="http://schemas.microsoft.com/office/drawing/2014/main" id="{A9AA26B0-FEC5-224F-BDB0-AB6B7C1D792A}"/>
+              </a:ext>
+            </a:extLst>
+          </p:cNvPr>
+          <p:cNvSpPr/>
+          <p:nvPr/>
+        </p:nvSpPr>
+        <p:spPr>
+          <a:xfrm>
+            <a:off x="8692396" y="4288103"/>
+            <a:ext cx="3038011" cy="369332"/>
+          </a:xfrm>
+          <a:prstGeom prst="rect">
+            <a:avLst/>
+          </a:prstGeom>
+        </p:spPr>
+        <p:txBody>
+          <a:bodyPr wrap="none">
+            <a:spAutoFit/>
+          </a:bodyPr>
+          <a:lstStyle/>
+          <a:p>
+            <a:r>
+              <a:rPr lang="en-US" dirty="0">
+                <a:solidFill>
+                  <a:schemeClr val="tx1">
+                    <a:lumMod val="50000"/>
+                    <a:lumOff val="50000"/>
+                  </a:schemeClr>
+                </a:solidFill>
+                <a:latin typeface="Copperplate" panose="02000504000000020004" pitchFamily="2" charset="77"/>
+                <a:ea typeface="Apple Symbols" panose="02000000000000000000" pitchFamily="2" charset="-79"/>
+                <a:cs typeface="Beirut" pitchFamily="2" charset="-78"/>
+              </a:rPr>
+              <a:t>Own the (Market) Curve</a:t>
+            </a:r>
+            <a:endParaRPr lang="en-US" dirty="0"/>
           </a:p>
         </p:txBody>
       </p:sp>
@@ -16286,7 +16491,7 @@
         <p:spPr>
           <a:xfrm>
             <a:off x="789709" y="1163777"/>
-            <a:ext cx="10751127" cy="923330"/>
+            <a:ext cx="10751127" cy="2031325"/>
           </a:xfrm>
           <a:prstGeom prst="rect">
             <a:avLst/>
@@ -16299,34 +16504,108 @@
           </a:bodyPr>
           <a:lstStyle/>
           <a:p>
-            <a:pPr marL="285750" indent="-285750">
-              <a:buFont typeface="Arial" panose="020B0604020202020204" pitchFamily="34" charset="0"/>
-              <a:buChar char="•"/>
-            </a:pPr>
             <a:r>
-              <a:rPr lang="en-US" dirty="0"/>
-              <a:t>Description [TO DO]</a:t>
+              <a:rPr lang="en-US" b="1" dirty="0"/>
+              <a:t>Description</a:t>
             </a:r>
           </a:p>
           <a:p>
-            <a:pPr marL="285750" indent="-285750">
-              <a:buFont typeface="Arial" panose="020B0604020202020204" pitchFamily="34" charset="0"/>
-              <a:buChar char="•"/>
-            </a:pPr>
             <a:r>
               <a:rPr lang="en-US" dirty="0"/>
-              <a:t>Motivation for Development [TO DO]</a:t>
+              <a:t>Stock Stalker aggregates the latest stock prices and financial information from various APIs.</a:t>
             </a:r>
           </a:p>
           <a:p>
-            <a:pPr marL="285750" indent="-285750">
-              <a:buFont typeface="Arial" panose="020B0604020202020204" pitchFamily="34" charset="0"/>
-              <a:buChar char="•"/>
-            </a:pPr>
+            <a:endParaRPr lang="en-US" dirty="0"/>
+          </a:p>
+          <a:p>
+            <a:r>
+              <a:rPr lang="en-US" b="1" dirty="0"/>
+              <a:t>Motivations for Building</a:t>
+            </a:r>
+          </a:p>
+          <a:p>
             <a:r>
               <a:rPr lang="en-US" dirty="0"/>
-              <a:t>User Story [TO DO]</a:t>
+              <a:t>We knew we wanted to help people during these uncertain times, so we thought that we could do that by aggregating timely and relevant financial information from various APIs. </a:t>
             </a:r>
+          </a:p>
+          <a:p>
+            <a:endParaRPr lang="en-US" dirty="0"/>
+          </a:p>
+        </p:txBody>
+      </p:sp>
+      <p:pic>
+        <p:nvPicPr>
+          <p:cNvPr id="4" name="Picture 3">
+            <a:extLst>
+              <a:ext uri="{FF2B5EF4-FFF2-40B4-BE49-F238E27FC236}">
+                <a16:creationId xmlns:a16="http://schemas.microsoft.com/office/drawing/2014/main" id="{65948D11-0231-F94F-8E60-621203D27717}"/>
+              </a:ext>
+            </a:extLst>
+          </p:cNvPr>
+          <p:cNvPicPr>
+            <a:picLocks noChangeAspect="1"/>
+          </p:cNvPicPr>
+          <p:nvPr/>
+        </p:nvPicPr>
+        <p:blipFill>
+          <a:blip r:embed="rId2"/>
+          <a:stretch>
+            <a:fillRect/>
+          </a:stretch>
+        </p:blipFill>
+        <p:spPr>
+          <a:xfrm>
+            <a:off x="8040250" y="3129874"/>
+            <a:ext cx="3429000" cy="2565400"/>
+          </a:xfrm>
+          <a:prstGeom prst="rect">
+            <a:avLst/>
+          </a:prstGeom>
+        </p:spPr>
+      </p:pic>
+      <p:sp>
+        <p:nvSpPr>
+          <p:cNvPr id="6" name="TextBox 5">
+            <a:extLst>
+              <a:ext uri="{FF2B5EF4-FFF2-40B4-BE49-F238E27FC236}">
+                <a16:creationId xmlns:a16="http://schemas.microsoft.com/office/drawing/2014/main" id="{01746744-1C81-A24E-A256-4061844C9889}"/>
+              </a:ext>
+            </a:extLst>
+          </p:cNvPr>
+          <p:cNvSpPr txBox="1"/>
+          <p:nvPr/>
+        </p:nvSpPr>
+        <p:spPr>
+          <a:xfrm>
+            <a:off x="771762" y="3237641"/>
+            <a:ext cx="6173799" cy="2031325"/>
+          </a:xfrm>
+          <a:prstGeom prst="rect">
+            <a:avLst/>
+          </a:prstGeom>
+          <a:noFill/>
+        </p:spPr>
+        <p:txBody>
+          <a:bodyPr wrap="square" rtlCol="0">
+            <a:spAutoFit/>
+          </a:bodyPr>
+          <a:lstStyle/>
+          <a:p>
+            <a:r>
+              <a:rPr lang="en-US" b="1" dirty="0"/>
+              <a:t>User Story</a:t>
+            </a:r>
+          </a:p>
+          <a:p>
+            <a:r>
+              <a:rPr lang="en-US" dirty="0"/>
+              <a:t>Warren, is a savvy stock market investor, he wants to easily look up companies' prices &amp; other key financial information in order to make an informed purchase or sell decision. He utilizes the Stock Stalker mobile app to supplement his various buying &amp; selling decisions…</a:t>
+            </a:r>
+          </a:p>
+          <a:p>
+            <a:endParaRPr lang="en-US" dirty="0"/>
           </a:p>
         </p:txBody>
       </p:sp>
@@ -17672,7 +17951,7 @@
         <p:spPr>
           <a:xfrm>
             <a:off x="789709" y="1122213"/>
-            <a:ext cx="10751127" cy="1200329"/>
+            <a:ext cx="10751127" cy="4801314"/>
           </a:xfrm>
           <a:prstGeom prst="rect">
             <a:avLst/>
@@ -17685,13 +17964,9 @@
           </a:bodyPr>
           <a:lstStyle/>
           <a:p>
-            <a:pPr marL="285750" indent="-285750">
-              <a:buFont typeface="Arial" panose="020B0604020202020204" pitchFamily="34" charset="0"/>
-              <a:buChar char="•"/>
-            </a:pPr>
             <a:r>
-              <a:rPr lang="en-US" dirty="0"/>
-              <a:t>Technologies used [TO-DO]</a:t>
+              <a:rPr lang="en-US" b="1" dirty="0"/>
+              <a:t>Technologies Used</a:t>
             </a:r>
           </a:p>
           <a:p>
@@ -17701,7 +17976,15 @@
             </a:pPr>
             <a:r>
               <a:rPr lang="en-US" dirty="0"/>
-              <a:t>Breakdown of tasks and roles [TO-DO]</a:t>
+              <a:t>The Stock Ticker is by the </a:t>
+            </a:r>
+            <a:r>
+              <a:rPr lang="en-US" dirty="0" err="1"/>
+              <a:t>Intrinio</a:t>
+            </a:r>
+            <a:r>
+              <a:rPr lang="en-US" dirty="0"/>
+              <a:t> third-party API.</a:t>
             </a:r>
           </a:p>
           <a:p>
@@ -17711,7 +17994,7 @@
             </a:pPr>
             <a:r>
               <a:rPr lang="en-US" dirty="0"/>
-              <a:t>Challenges [TO-DO]</a:t>
+              <a:t>The Stock Pricing is found by the Yahoo server-side API. </a:t>
             </a:r>
           </a:p>
           <a:p>
@@ -17721,7 +18004,76 @@
             </a:pPr>
             <a:r>
               <a:rPr lang="en-US" dirty="0"/>
-              <a:t>Successes [TO-DO]</a:t>
+              <a:t>The Key financial information is by the Bloomberg server-side API.</a:t>
+            </a:r>
+          </a:p>
+          <a:p>
+            <a:endParaRPr lang="en-US" dirty="0"/>
+          </a:p>
+          <a:p>
+            <a:r>
+              <a:rPr lang="en-US" b="1" dirty="0"/>
+              <a:t>Breakdown of tasks and roles</a:t>
+            </a:r>
+          </a:p>
+          <a:p>
+            <a:pPr marL="285750" indent="-285750">
+              <a:buFont typeface="Arial" panose="020B0604020202020204" pitchFamily="34" charset="0"/>
+              <a:buChar char="•"/>
+            </a:pPr>
+            <a:r>
+              <a:rPr lang="en-US" dirty="0"/>
+              <a:t>We were able to break down various tasks and roles by utilizing </a:t>
+            </a:r>
+            <a:r>
+              <a:rPr lang="en-US" dirty="0" err="1"/>
+              <a:t>KanBan</a:t>
+            </a:r>
+            <a:r>
+              <a:rPr lang="en-US" dirty="0"/>
+              <a:t> boards and owning user stories. The daily stand-up meetings allowed us to discuss and remove roadblocks, and then test each module of the code before pushing and deploying it to the master-branch.</a:t>
+            </a:r>
+          </a:p>
+          <a:p>
+            <a:endParaRPr lang="en-US" dirty="0"/>
+          </a:p>
+          <a:p>
+            <a:r>
+              <a:rPr lang="en-US" b="1" dirty="0"/>
+              <a:t>Challenges</a:t>
+            </a:r>
+          </a:p>
+          <a:p>
+            <a:pPr marL="285750" indent="-285750">
+              <a:buFont typeface="Arial" panose="020B0604020202020204" pitchFamily="34" charset="0"/>
+              <a:buChar char="•"/>
+            </a:pPr>
+            <a:r>
+              <a:rPr lang="en-US" dirty="0"/>
+              <a:t>Originally, we create a job-searching and posting application, utilizing the Indeed API. We were not able to obtain a publisher API, which caused us to pivot. But we were able to use much of the work and processes that we created in order to design &amp; execute Stock Stalker.</a:t>
+            </a:r>
+          </a:p>
+          <a:p>
+            <a:pPr marL="285750" indent="-285750">
+              <a:buFont typeface="Arial" panose="020B0604020202020204" pitchFamily="34" charset="0"/>
+              <a:buChar char="•"/>
+            </a:pPr>
+            <a:endParaRPr lang="en-US" dirty="0"/>
+          </a:p>
+          <a:p>
+            <a:r>
+              <a:rPr lang="en-US" b="1" dirty="0"/>
+              <a:t>Successes</a:t>
+            </a:r>
+          </a:p>
+          <a:p>
+            <a:pPr marL="285750" indent="-285750">
+              <a:buFont typeface="Arial" panose="020B0604020202020204" pitchFamily="34" charset="0"/>
+              <a:buChar char="•"/>
+            </a:pPr>
+            <a:r>
+              <a:rPr lang="en-US" dirty="0"/>
+              <a:t>We were able to successfully create the application utilizing the user’s input to call the APIs. </a:t>
             </a:r>
           </a:p>
         </p:txBody>
@@ -19053,6 +19405,99 @@
           </a:p>
         </p:txBody>
       </p:sp>
+      <p:pic>
+        <p:nvPicPr>
+          <p:cNvPr id="8" name="Picture 7" descr="A screenshot of a cell phone&#10;&#10;Description automatically generated">
+            <a:hlinkClick r:id="rId2"/>
+            <a:extLst>
+              <a:ext uri="{FF2B5EF4-FFF2-40B4-BE49-F238E27FC236}">
+                <a16:creationId xmlns:a16="http://schemas.microsoft.com/office/drawing/2014/main" id="{F8F3BC8C-AA53-7A4F-BD43-865FE347944B}"/>
+              </a:ext>
+            </a:extLst>
+          </p:cNvPr>
+          <p:cNvPicPr>
+            <a:picLocks noChangeAspect="1"/>
+          </p:cNvPicPr>
+          <p:nvPr/>
+        </p:nvPicPr>
+        <p:blipFill>
+          <a:blip r:embed="rId3"/>
+          <a:stretch>
+            <a:fillRect/>
+          </a:stretch>
+        </p:blipFill>
+        <p:spPr>
+          <a:xfrm>
+            <a:off x="1505521" y="1447965"/>
+            <a:ext cx="2380390" cy="4211460"/>
+          </a:xfrm>
+          <a:prstGeom prst="rect">
+            <a:avLst/>
+          </a:prstGeom>
+        </p:spPr>
+      </p:pic>
+      <p:pic>
+        <p:nvPicPr>
+          <p:cNvPr id="11" name="Picture 10" descr="A screenshot of a cell phone&#10;&#10;Description automatically generated">
+            <a:hlinkClick r:id="rId2"/>
+            <a:extLst>
+              <a:ext uri="{FF2B5EF4-FFF2-40B4-BE49-F238E27FC236}">
+                <a16:creationId xmlns:a16="http://schemas.microsoft.com/office/drawing/2014/main" id="{5C383A91-06CD-AA49-9969-E7BC5D8188DA}"/>
+              </a:ext>
+            </a:extLst>
+          </p:cNvPr>
+          <p:cNvPicPr>
+            <a:picLocks noChangeAspect="1"/>
+          </p:cNvPicPr>
+          <p:nvPr/>
+        </p:nvPicPr>
+        <p:blipFill>
+          <a:blip r:embed="rId4"/>
+          <a:stretch>
+            <a:fillRect/>
+          </a:stretch>
+        </p:blipFill>
+        <p:spPr>
+          <a:xfrm>
+            <a:off x="7920930" y="1494026"/>
+            <a:ext cx="2380390" cy="4211460"/>
+          </a:xfrm>
+          <a:prstGeom prst="rect">
+            <a:avLst/>
+          </a:prstGeom>
+        </p:spPr>
+      </p:pic>
+      <p:pic>
+        <p:nvPicPr>
+          <p:cNvPr id="13" name="Picture 12" descr="A screenshot of a cell phone&#10;&#10;Description automatically generated">
+            <a:hlinkClick r:id="rId2"/>
+            <a:extLst>
+              <a:ext uri="{FF2B5EF4-FFF2-40B4-BE49-F238E27FC236}">
+                <a16:creationId xmlns:a16="http://schemas.microsoft.com/office/drawing/2014/main" id="{096D4EA8-9AB6-EC4B-9596-81E18B5961C8}"/>
+              </a:ext>
+            </a:extLst>
+          </p:cNvPr>
+          <p:cNvPicPr>
+            <a:picLocks noChangeAspect="1"/>
+          </p:cNvPicPr>
+          <p:nvPr/>
+        </p:nvPicPr>
+        <p:blipFill>
+          <a:blip r:embed="rId5"/>
+          <a:stretch>
+            <a:fillRect/>
+          </a:stretch>
+        </p:blipFill>
+        <p:spPr>
+          <a:xfrm>
+            <a:off x="4859940" y="1488068"/>
+            <a:ext cx="2380390" cy="4211460"/>
+          </a:xfrm>
+          <a:prstGeom prst="rect">
+            <a:avLst/>
+          </a:prstGeom>
+        </p:spPr>
+      </p:pic>
     </p:spTree>
     <p:extLst>
       <p:ext uri="{BB962C8B-B14F-4D97-AF65-F5344CB8AC3E}">
@@ -20394,15 +20839,15 @@
         </p:nvSpPr>
         <p:spPr>
           <a:xfrm>
-            <a:off x="396365" y="1227954"/>
-            <a:ext cx="6096000" cy="369332"/>
+            <a:off x="937136" y="1696572"/>
+            <a:ext cx="2911607" cy="1200329"/>
           </a:xfrm>
           <a:prstGeom prst="rect">
             <a:avLst/>
           </a:prstGeom>
         </p:spPr>
         <p:txBody>
-          <a:bodyPr>
+          <a:bodyPr wrap="square">
             <a:spAutoFit/>
           </a:bodyPr>
           <a:lstStyle/>
@@ -20413,11 +20858,215 @@
             </a:pPr>
             <a:r>
               <a:rPr lang="en-US" dirty="0"/>
-              <a:t>Future Project Vision [TO-DO]</a:t>
+              <a:t>Increase chart functionality and add various dashboards and stock watchlist. </a:t>
             </a:r>
           </a:p>
         </p:txBody>
       </p:sp>
+      <p:pic>
+        <p:nvPicPr>
+          <p:cNvPr id="4" name="Picture 3">
+            <a:extLst>
+              <a:ext uri="{FF2B5EF4-FFF2-40B4-BE49-F238E27FC236}">
+                <a16:creationId xmlns:a16="http://schemas.microsoft.com/office/drawing/2014/main" id="{75DA75F1-D89C-F046-8A8E-9B880B8D1AE8}"/>
+              </a:ext>
+            </a:extLst>
+          </p:cNvPr>
+          <p:cNvPicPr>
+            <a:picLocks noChangeAspect="1"/>
+          </p:cNvPicPr>
+          <p:nvPr/>
+        </p:nvPicPr>
+        <p:blipFill>
+          <a:blip r:embed="rId2"/>
+          <a:stretch>
+            <a:fillRect/>
+          </a:stretch>
+        </p:blipFill>
+        <p:spPr>
+          <a:xfrm>
+            <a:off x="4471161" y="1696571"/>
+            <a:ext cx="2917469" cy="1200330"/>
+          </a:xfrm>
+          <a:prstGeom prst="rect">
+            <a:avLst/>
+          </a:prstGeom>
+        </p:spPr>
+      </p:pic>
+      <p:pic>
+        <p:nvPicPr>
+          <p:cNvPr id="6" name="Picture 5">
+            <a:extLst>
+              <a:ext uri="{FF2B5EF4-FFF2-40B4-BE49-F238E27FC236}">
+                <a16:creationId xmlns:a16="http://schemas.microsoft.com/office/drawing/2014/main" id="{CF6BC9D5-ECEB-D64D-959C-391B548C3661}"/>
+              </a:ext>
+            </a:extLst>
+          </p:cNvPr>
+          <p:cNvPicPr>
+            <a:picLocks noChangeAspect="1"/>
+          </p:cNvPicPr>
+          <p:nvPr/>
+        </p:nvPicPr>
+        <p:blipFill>
+          <a:blip r:embed="rId3"/>
+          <a:stretch>
+            <a:fillRect/>
+          </a:stretch>
+        </p:blipFill>
+        <p:spPr>
+          <a:xfrm>
+            <a:off x="8820760" y="527561"/>
+            <a:ext cx="2594864" cy="2486242"/>
+          </a:xfrm>
+          <a:prstGeom prst="rect">
+            <a:avLst/>
+          </a:prstGeom>
+        </p:spPr>
+      </p:pic>
+      <p:sp>
+        <p:nvSpPr>
+          <p:cNvPr id="7" name="TextBox 6">
+            <a:extLst>
+              <a:ext uri="{FF2B5EF4-FFF2-40B4-BE49-F238E27FC236}">
+                <a16:creationId xmlns:a16="http://schemas.microsoft.com/office/drawing/2014/main" id="{675B5D0B-D11D-854F-A18A-8590C0BC4106}"/>
+              </a:ext>
+            </a:extLst>
+          </p:cNvPr>
+          <p:cNvSpPr txBox="1"/>
+          <p:nvPr/>
+        </p:nvSpPr>
+        <p:spPr>
+          <a:xfrm>
+            <a:off x="961832" y="3598721"/>
+            <a:ext cx="3116392" cy="1754326"/>
+          </a:xfrm>
+          <a:prstGeom prst="rect">
+            <a:avLst/>
+          </a:prstGeom>
+          <a:noFill/>
+        </p:spPr>
+        <p:txBody>
+          <a:bodyPr wrap="square" rtlCol="0">
+            <a:spAutoFit/>
+          </a:bodyPr>
+          <a:lstStyle/>
+          <a:p>
+            <a:pPr marL="285750" indent="-285750">
+              <a:buFont typeface="Arial" panose="020B0604020202020204" pitchFamily="34" charset="0"/>
+              <a:buChar char="•"/>
+            </a:pPr>
+            <a:endParaRPr lang="en-US" dirty="0"/>
+          </a:p>
+          <a:p>
+            <a:pPr marL="285750" indent="-285750">
+              <a:buFont typeface="Arial" panose="020B0604020202020204" pitchFamily="34" charset="0"/>
+              <a:buChar char="•"/>
+            </a:pPr>
+            <a:r>
+              <a:rPr lang="en-US" dirty="0"/>
+              <a:t>We would like to allow users to export their info into excel to create portfolio models. </a:t>
+            </a:r>
+          </a:p>
+          <a:p>
+            <a:endParaRPr lang="en-US" dirty="0"/>
+          </a:p>
+        </p:txBody>
+      </p:sp>
+      <p:pic>
+        <p:nvPicPr>
+          <p:cNvPr id="8" name="Picture 7">
+            <a:extLst>
+              <a:ext uri="{FF2B5EF4-FFF2-40B4-BE49-F238E27FC236}">
+                <a16:creationId xmlns:a16="http://schemas.microsoft.com/office/drawing/2014/main" id="{3AB63EE0-4C29-5B43-9F0B-0D7610C5C086}"/>
+              </a:ext>
+            </a:extLst>
+          </p:cNvPr>
+          <p:cNvPicPr>
+            <a:picLocks noChangeAspect="1"/>
+          </p:cNvPicPr>
+          <p:nvPr/>
+        </p:nvPicPr>
+        <p:blipFill>
+          <a:blip r:embed="rId4"/>
+          <a:stretch>
+            <a:fillRect/>
+          </a:stretch>
+        </p:blipFill>
+        <p:spPr>
+          <a:xfrm>
+            <a:off x="7425714" y="3598721"/>
+            <a:ext cx="3989910" cy="1835917"/>
+          </a:xfrm>
+          <a:prstGeom prst="rect">
+            <a:avLst/>
+          </a:prstGeom>
+        </p:spPr>
+      </p:pic>
+      <p:pic>
+        <p:nvPicPr>
+          <p:cNvPr id="9" name="Picture 8">
+            <a:extLst>
+              <a:ext uri="{FF2B5EF4-FFF2-40B4-BE49-F238E27FC236}">
+                <a16:creationId xmlns:a16="http://schemas.microsoft.com/office/drawing/2014/main" id="{998FB989-21EC-004A-8330-C44B873C0610}"/>
+              </a:ext>
+            </a:extLst>
+          </p:cNvPr>
+          <p:cNvPicPr>
+            <a:picLocks noChangeAspect="1"/>
+          </p:cNvPicPr>
+          <p:nvPr/>
+        </p:nvPicPr>
+        <p:blipFill>
+          <a:blip r:embed="rId5"/>
+          <a:stretch>
+            <a:fillRect/>
+          </a:stretch>
+        </p:blipFill>
+        <p:spPr>
+          <a:xfrm>
+            <a:off x="5651751" y="4052156"/>
+            <a:ext cx="1749227" cy="1050933"/>
+          </a:xfrm>
+          <a:prstGeom prst="rect">
+            <a:avLst/>
+          </a:prstGeom>
+        </p:spPr>
+      </p:pic>
+      <p:pic>
+        <p:nvPicPr>
+          <p:cNvPr id="12" name="Graphic 11">
+            <a:extLst>
+              <a:ext uri="{FF2B5EF4-FFF2-40B4-BE49-F238E27FC236}">
+                <a16:creationId xmlns:a16="http://schemas.microsoft.com/office/drawing/2014/main" id="{77BE605D-9140-6049-BFBC-6AE4F4B0963A}"/>
+              </a:ext>
+            </a:extLst>
+          </p:cNvPr>
+          <p:cNvPicPr>
+            <a:picLocks noChangeAspect="1"/>
+          </p:cNvPicPr>
+          <p:nvPr/>
+        </p:nvPicPr>
+        <p:blipFill>
+          <a:blip r:embed="rId6">
+            <a:extLst>
+              <a:ext uri="{96DAC541-7B7A-43D3-8B79-37D633B846F1}">
+                <asvg:svgBlip xmlns:asvg="http://schemas.microsoft.com/office/drawing/2016/SVG/main" r:embed="rId7"/>
+              </a:ext>
+            </a:extLst>
+          </a:blip>
+          <a:srcRect/>
+          <a:stretch/>
+        </p:blipFill>
+        <p:spPr>
+          <a:xfrm>
+            <a:off x="4029456" y="3859840"/>
+            <a:ext cx="1533364" cy="1533364"/>
+          </a:xfrm>
+          <a:prstGeom prst="rect">
+            <a:avLst/>
+          </a:prstGeom>
+        </p:spPr>
+      </p:pic>
     </p:spTree>
     <p:extLst>
       <p:ext uri="{BB962C8B-B14F-4D97-AF65-F5344CB8AC3E}">
@@ -21760,7 +22409,7 @@
         <p:spPr>
           <a:xfrm>
             <a:off x="717877" y="1227954"/>
-            <a:ext cx="6096000" cy="646331"/>
+            <a:ext cx="6096000" cy="1477328"/>
           </a:xfrm>
           <a:prstGeom prst="rect">
             <a:avLst/>
@@ -21771,6 +22420,15 @@
             <a:spAutoFit/>
           </a:bodyPr>
           <a:lstStyle/>
+          <a:p>
+            <a:r>
+              <a:rPr lang="en-US" dirty="0"/>
+              <a:t>Deployed</a:t>
+            </a:r>
+            <a:endParaRPr lang="en-US" dirty="0">
+              <a:hlinkClick r:id="rId2"/>
+            </a:endParaRPr>
+          </a:p>
           <a:p>
             <a:pPr marL="285750" indent="-285750">
               <a:buFont typeface="Arial" panose="020B0604020202020204" pitchFamily="34" charset="0"/>
@@ -21785,6 +22443,20 @@
             <a:endParaRPr lang="en-US" u="sng" dirty="0"/>
           </a:p>
           <a:p>
+            <a:endParaRPr lang="en-US" dirty="0"/>
+          </a:p>
+          <a:p>
+            <a:r>
+              <a:rPr lang="en-US" dirty="0" err="1"/>
+              <a:t>Github</a:t>
+            </a:r>
+            <a:r>
+              <a:rPr lang="en-US" dirty="0"/>
+              <a:t> repo</a:t>
+            </a:r>
+            <a:endParaRPr lang="en-US" u="sng" dirty="0"/>
+          </a:p>
+          <a:p>
             <a:pPr marL="285750" indent="-285750">
               <a:buFont typeface="Arial" panose="020B0604020202020204" pitchFamily="34" charset="0"/>
               <a:buChar char="•"/>
@@ -21793,13 +22465,7 @@
               <a:rPr lang="en-US" dirty="0">
                 <a:hlinkClick r:id="rId3"/>
               </a:rPr>
-              <a:t>https://github.com/wrkfullerton/</a:t>
-            </a:r>
-            <a:r>
-              <a:rPr lang="en-US">
-                <a:hlinkClick r:id="rId3"/>
-              </a:rPr>
-              <a:t>StockStalker</a:t>
+              <a:t>https://github.com/wrkfullerton/StockStalker</a:t>
             </a:r>
             <a:endParaRPr lang="en-US" dirty="0"/>
           </a:p>

</xml_diff>